<commit_message>
[develop] add animation in powerpoint
</commit_message>
<xml_diff>
--- a/doc/勉強会_WebRTC_SkyWay_170122.pptx
+++ b/doc/勉強会_WebRTC_SkyWay_170122.pptx
@@ -14435,17 +14435,21 @@
                 <a:cs typeface="Montserrat" charset="0"/>
                 <a:sym typeface="+mn-ea"/>
               </a:rPr>
-              <a:t>メディアに関する情報を交換するだけでなく、ピアはネットワーク接続に関する情報を交換する</a:t>
+              <a:t>ネットワーク接続に関する情報</a:t>
             </a:r>
             <a:r>
-              <a:rPr lang="ja-JP" dirty="0">
+              <a:rPr lang="en-US" dirty="0">
                 <a:ea typeface="Montserrat" charset="0"/>
                 <a:cs typeface="Montserrat" charset="0"/>
                 <a:sym typeface="+mn-ea"/>
               </a:rPr>
-              <a:t>必要</a:t>
+              <a:t> 「NAT(=Network Address Translation)」</a:t>
             </a:r>
-            <a:endParaRPr lang="en-US"/>
+            <a:endParaRPr lang="en-US" dirty="0">
+              <a:ea typeface="Montserrat" charset="0"/>
+              <a:cs typeface="Montserrat" charset="0"/>
+              <a:sym typeface="+mn-ea"/>
+            </a:endParaRPr>
           </a:p>
         </p:txBody>
       </p:sp>
@@ -14533,7 +14537,7 @@
         <p:spPr>
           <a:xfrm>
             <a:off x="386080" y="1249680"/>
-            <a:ext cx="11189335" cy="2306955"/>
+            <a:ext cx="11189335" cy="1753235"/>
           </a:xfrm>
           <a:prstGeom prst="rect">
             <a:avLst/>
@@ -14584,19 +14588,14 @@
               </a:rPr>
               <a:t>得る</a:t>
             </a:r>
-            <a:endParaRPr lang="ja-JP" dirty="0">
-              <a:ea typeface="Montserrat" charset="0"/>
-              <a:cs typeface="Calibri" panose="020F0502020204030204" pitchFamily="34" charset="0"/>
-            </a:endParaRPr>
-          </a:p>
-          <a:p>
-            <a:pPr marL="342900" indent="-342900">
-              <a:lnSpc>
-                <a:spcPct val="200000"/>
-              </a:lnSpc>
-              <a:buFont typeface="Wingdings" panose="05000000000000000000" charset="0"/>
-              <a:buChar char="§"/>
-            </a:pPr>
+            <a:r>
+              <a:rPr lang="en-US" dirty="0">
+                <a:ea typeface="Montserrat" charset="0"/>
+                <a:cs typeface="Calibri" panose="020F0502020204030204" pitchFamily="34" charset="0"/>
+                <a:sym typeface="+mn-ea"/>
+              </a:rPr>
+              <a:t>(</a:t>
+            </a:r>
             <a:r>
               <a:rPr lang="ja-JP" dirty="0">
                 <a:ea typeface="Montserrat" charset="0"/>
@@ -14621,6 +14620,14 @@
               </a:rPr>
               <a:t>データ</a:t>
             </a:r>
+            <a:r>
+              <a:rPr lang="en-US" altLang="ja-JP" dirty="0">
+                <a:ea typeface="Montserrat" charset="0"/>
+                <a:cs typeface="Calibri" panose="020F0502020204030204" pitchFamily="34" charset="0"/>
+                <a:sym typeface="+mn-ea"/>
+              </a:rPr>
+              <a:t>)</a:t>
+            </a:r>
             <a:endParaRPr lang="ja-JP" dirty="0">
               <a:ea typeface="Montserrat" charset="0"/>
               <a:cs typeface="Calibri" panose="020F0502020204030204" pitchFamily="34" charset="0"/>
@@ -14640,7 +14647,22 @@
                 <a:cs typeface="Calibri" panose="020F0502020204030204" pitchFamily="34" charset="0"/>
                 <a:sym typeface="+mn-ea"/>
               </a:rPr>
-              <a:t>15〜20％のSTUNサーバーに障害が発生した場合、P2Pのような通信ができません。そこで、考えられたのが「TURNサーバー」です。</a:t>
+              <a:t>15〜20％のSTUNサーバーに障害が発生した場合、P2Pのような通信ができません。</a:t>
+            </a:r>
+            <a:br>
+              <a:rPr lang="ja-JP" dirty="0">
+                <a:ea typeface="Montserrat" charset="0"/>
+                <a:cs typeface="Calibri" panose="020F0502020204030204" pitchFamily="34" charset="0"/>
+                <a:sym typeface="+mn-ea"/>
+              </a:rPr>
+            </a:br>
+            <a:r>
+              <a:rPr lang="ja-JP" dirty="0">
+                <a:ea typeface="Montserrat" charset="0"/>
+                <a:cs typeface="Calibri" panose="020F0502020204030204" pitchFamily="34" charset="0"/>
+                <a:sym typeface="+mn-ea"/>
+              </a:rPr>
+              <a:t>そこで、考えられたのが「TURNサーバー」です。</a:t>
             </a:r>
             <a:endParaRPr lang="en-US">
               <a:cs typeface="Calibri" panose="020F0502020204030204" pitchFamily="34" charset="0"/>
@@ -14937,7 +14959,7 @@
                 <a:cs typeface="Calibri" panose="020F0502020204030204" pitchFamily="34" charset="0"/>
                 <a:sym typeface="+mn-ea"/>
               </a:rPr>
-              <a:t>TURNサーバーでは、通信の際に発生するストリームデータの受け渡しをするブリッジの役割を担います。</a:t>
+              <a:t>通信の際に発生するストリームデータの受け渡しをするブリッジの役割を担います。</a:t>
             </a:r>
             <a:endParaRPr lang="en-US">
               <a:cs typeface="Calibri" panose="020F0502020204030204" pitchFamily="34" charset="0"/>
@@ -15338,7 +15360,7 @@
         </p:blipFill>
         <p:spPr>
           <a:xfrm>
-            <a:off x="9356090" y="4586605"/>
+            <a:off x="9346565" y="4586605"/>
             <a:ext cx="743585" cy="743585"/>
           </a:xfrm>
           <a:prstGeom prst="rect">
@@ -15388,7 +15410,7 @@
         </p:blipFill>
         <p:spPr>
           <a:xfrm>
-            <a:off x="1194435" y="4586605"/>
+            <a:off x="1184910" y="4586605"/>
             <a:ext cx="743585" cy="743585"/>
           </a:xfrm>
           <a:prstGeom prst="rect">
@@ -15462,7 +15484,7 @@
         </p:nvCxnSpPr>
         <p:spPr>
           <a:xfrm>
-            <a:off x="3044825" y="3744595"/>
+            <a:off x="3044825" y="3753485"/>
             <a:ext cx="2159635" cy="1313815"/>
           </a:xfrm>
           <a:prstGeom prst="straightConnector1">
@@ -15561,7 +15583,7 @@
         </p:nvCxnSpPr>
         <p:spPr>
           <a:xfrm flipH="1" flipV="1">
-            <a:off x="3126740" y="3611880"/>
+            <a:off x="3126740" y="3620770"/>
             <a:ext cx="2128520" cy="1252855"/>
           </a:xfrm>
           <a:prstGeom prst="straightConnector1">
@@ -15866,7 +15888,7 @@
         </p:nvCxnSpPr>
         <p:spPr>
           <a:xfrm flipV="1">
-            <a:off x="1598930" y="3846195"/>
+            <a:off x="1589405" y="3846195"/>
             <a:ext cx="478790" cy="631190"/>
           </a:xfrm>
           <a:prstGeom prst="straightConnector1">
@@ -15900,7 +15922,7 @@
         </p:nvCxnSpPr>
         <p:spPr>
           <a:xfrm>
-            <a:off x="9197340" y="3856355"/>
+            <a:off x="9187815" y="3856355"/>
             <a:ext cx="549910" cy="662305"/>
           </a:xfrm>
           <a:prstGeom prst="straightConnector1">
@@ -16228,6 +16250,1291 @@
   <p:clrMapOvr>
     <a:masterClrMapping/>
   </p:clrMapOvr>
+  <p:timing>
+    <p:tnLst>
+      <p:par>
+        <p:cTn id="1" dur="indefinite" restart="never" nodeType="tmRoot">
+          <p:childTnLst>
+            <p:seq concurrent="1" nextAc="seek">
+              <p:cTn id="2" dur="indefinite" nodeType="mainSeq">
+                <p:childTnLst>
+                  <p:par>
+                    <p:cTn id="3" fill="hold">
+                      <p:stCondLst>
+                        <p:cond delay="indefinite"/>
+                      </p:stCondLst>
+                      <p:childTnLst>
+                        <p:par>
+                          <p:cTn id="4" fill="hold">
+                            <p:stCondLst>
+                              <p:cond delay="0"/>
+                            </p:stCondLst>
+                            <p:childTnLst>
+                              <p:par>
+                                <p:cTn id="5" presetID="22" presetClass="entr" presetSubtype="4" fill="hold" grpId="0" nodeType="clickEffect">
+                                  <p:stCondLst>
+                                    <p:cond delay="0"/>
+                                  </p:stCondLst>
+                                  <p:childTnLst>
+                                    <p:set>
+                                      <p:cBhvr>
+                                        <p:cTn id="6" dur="1" fill="hold">
+                                          <p:stCondLst>
+                                            <p:cond delay="0"/>
+                                          </p:stCondLst>
+                                        </p:cTn>
+                                        <p:tgtEl>
+                                          <p:spTgt spid="42"/>
+                                        </p:tgtEl>
+                                        <p:attrNameLst>
+                                          <p:attrName>style.visibility</p:attrName>
+                                        </p:attrNameLst>
+                                      </p:cBhvr>
+                                      <p:to>
+                                        <p:strVal val="visible"/>
+                                      </p:to>
+                                    </p:set>
+                                    <p:animEffect transition="in" filter="wipe(down)">
+                                      <p:cBhvr>
+                                        <p:cTn id="7" dur="500"/>
+                                        <p:tgtEl>
+                                          <p:spTgt spid="42"/>
+                                        </p:tgtEl>
+                                      </p:cBhvr>
+                                    </p:animEffect>
+                                  </p:childTnLst>
+                                </p:cTn>
+                              </p:par>
+                              <p:par>
+                                <p:cTn id="8" presetID="22" presetClass="entr" presetSubtype="4" fill="hold" nodeType="withEffect">
+                                  <p:stCondLst>
+                                    <p:cond delay="0"/>
+                                  </p:stCondLst>
+                                  <p:childTnLst>
+                                    <p:set>
+                                      <p:cBhvr>
+                                        <p:cTn id="9" dur="1" fill="hold">
+                                          <p:stCondLst>
+                                            <p:cond delay="0"/>
+                                          </p:stCondLst>
+                                        </p:cTn>
+                                        <p:tgtEl>
+                                          <p:spTgt spid="2"/>
+                                        </p:tgtEl>
+                                        <p:attrNameLst>
+                                          <p:attrName>style.visibility</p:attrName>
+                                        </p:attrNameLst>
+                                      </p:cBhvr>
+                                      <p:to>
+                                        <p:strVal val="visible"/>
+                                      </p:to>
+                                    </p:set>
+                                    <p:animEffect transition="in" filter="wipe(down)">
+                                      <p:cBhvr>
+                                        <p:cTn id="10" dur="500"/>
+                                        <p:tgtEl>
+                                          <p:spTgt spid="2"/>
+                                        </p:tgtEl>
+                                      </p:cBhvr>
+                                    </p:animEffect>
+                                  </p:childTnLst>
+                                </p:cTn>
+                              </p:par>
+                              <p:par>
+                                <p:cTn id="11" presetID="22" presetClass="entr" presetSubtype="4" fill="hold" nodeType="withEffect">
+                                  <p:stCondLst>
+                                    <p:cond delay="0"/>
+                                  </p:stCondLst>
+                                  <p:childTnLst>
+                                    <p:set>
+                                      <p:cBhvr>
+                                        <p:cTn id="12" dur="1" fill="hold">
+                                          <p:stCondLst>
+                                            <p:cond delay="0"/>
+                                          </p:stCondLst>
+                                        </p:cTn>
+                                        <p:tgtEl>
+                                          <p:spTgt spid="6"/>
+                                        </p:tgtEl>
+                                        <p:attrNameLst>
+                                          <p:attrName>style.visibility</p:attrName>
+                                        </p:attrNameLst>
+                                      </p:cBhvr>
+                                      <p:to>
+                                        <p:strVal val="visible"/>
+                                      </p:to>
+                                    </p:set>
+                                    <p:animEffect transition="in" filter="wipe(down)">
+                                      <p:cBhvr>
+                                        <p:cTn id="13" dur="500"/>
+                                        <p:tgtEl>
+                                          <p:spTgt spid="6"/>
+                                        </p:tgtEl>
+                                      </p:cBhvr>
+                                    </p:animEffect>
+                                  </p:childTnLst>
+                                </p:cTn>
+                              </p:par>
+                              <p:par>
+                                <p:cTn id="14" presetID="22" presetClass="entr" presetSubtype="4" fill="hold" grpId="0" nodeType="withEffect">
+                                  <p:stCondLst>
+                                    <p:cond delay="0"/>
+                                  </p:stCondLst>
+                                  <p:childTnLst>
+                                    <p:set>
+                                      <p:cBhvr>
+                                        <p:cTn id="15" dur="1" fill="hold">
+                                          <p:stCondLst>
+                                            <p:cond delay="0"/>
+                                          </p:stCondLst>
+                                        </p:cTn>
+                                        <p:tgtEl>
+                                          <p:spTgt spid="44"/>
+                                        </p:tgtEl>
+                                        <p:attrNameLst>
+                                          <p:attrName>style.visibility</p:attrName>
+                                        </p:attrNameLst>
+                                      </p:cBhvr>
+                                      <p:to>
+                                        <p:strVal val="visible"/>
+                                      </p:to>
+                                    </p:set>
+                                    <p:animEffect transition="in" filter="wipe(down)">
+                                      <p:cBhvr>
+                                        <p:cTn id="16" dur="500"/>
+                                        <p:tgtEl>
+                                          <p:spTgt spid="44"/>
+                                        </p:tgtEl>
+                                      </p:cBhvr>
+                                    </p:animEffect>
+                                  </p:childTnLst>
+                                </p:cTn>
+                              </p:par>
+                            </p:childTnLst>
+                          </p:cTn>
+                        </p:par>
+                      </p:childTnLst>
+                    </p:cTn>
+                  </p:par>
+                  <p:par>
+                    <p:cTn id="17" fill="hold">
+                      <p:stCondLst>
+                        <p:cond delay="indefinite"/>
+                      </p:stCondLst>
+                      <p:childTnLst>
+                        <p:par>
+                          <p:cTn id="18" fill="hold">
+                            <p:stCondLst>
+                              <p:cond delay="0"/>
+                            </p:stCondLst>
+                            <p:childTnLst>
+                              <p:par>
+                                <p:cTn id="19" presetID="9" presetClass="entr" presetSubtype="0" fill="hold" nodeType="clickEffect">
+                                  <p:stCondLst>
+                                    <p:cond delay="0"/>
+                                  </p:stCondLst>
+                                  <p:childTnLst>
+                                    <p:set>
+                                      <p:cBhvr>
+                                        <p:cTn id="20" dur="1" fill="hold">
+                                          <p:stCondLst>
+                                            <p:cond delay="0"/>
+                                          </p:stCondLst>
+                                        </p:cTn>
+                                        <p:tgtEl>
+                                          <p:spTgt spid="38"/>
+                                        </p:tgtEl>
+                                        <p:attrNameLst>
+                                          <p:attrName>style.visibility</p:attrName>
+                                        </p:attrNameLst>
+                                      </p:cBhvr>
+                                      <p:to>
+                                        <p:strVal val="visible"/>
+                                      </p:to>
+                                    </p:set>
+                                    <p:animEffect transition="in" filter="dissolve">
+                                      <p:cBhvr>
+                                        <p:cTn id="21" dur="500"/>
+                                        <p:tgtEl>
+                                          <p:spTgt spid="38"/>
+                                        </p:tgtEl>
+                                      </p:cBhvr>
+                                    </p:animEffect>
+                                  </p:childTnLst>
+                                </p:cTn>
+                              </p:par>
+                              <p:par>
+                                <p:cTn id="22" presetID="9" presetClass="entr" presetSubtype="0" fill="hold" nodeType="withEffect">
+                                  <p:stCondLst>
+                                    <p:cond delay="0"/>
+                                  </p:stCondLst>
+                                  <p:childTnLst>
+                                    <p:set>
+                                      <p:cBhvr>
+                                        <p:cTn id="23" dur="1" fill="hold">
+                                          <p:stCondLst>
+                                            <p:cond delay="0"/>
+                                          </p:stCondLst>
+                                        </p:cTn>
+                                        <p:tgtEl>
+                                          <p:spTgt spid="19"/>
+                                        </p:tgtEl>
+                                        <p:attrNameLst>
+                                          <p:attrName>style.visibility</p:attrName>
+                                        </p:attrNameLst>
+                                      </p:cBhvr>
+                                      <p:to>
+                                        <p:strVal val="visible"/>
+                                      </p:to>
+                                    </p:set>
+                                    <p:animEffect transition="in" filter="dissolve">
+                                      <p:cBhvr>
+                                        <p:cTn id="24" dur="500"/>
+                                        <p:tgtEl>
+                                          <p:spTgt spid="19"/>
+                                        </p:tgtEl>
+                                      </p:cBhvr>
+                                    </p:animEffect>
+                                  </p:childTnLst>
+                                </p:cTn>
+                              </p:par>
+                              <p:par>
+                                <p:cTn id="25" presetID="9" presetClass="entr" presetSubtype="0" fill="hold" grpId="0" nodeType="withEffect">
+                                  <p:stCondLst>
+                                    <p:cond delay="0"/>
+                                  </p:stCondLst>
+                                  <p:childTnLst>
+                                    <p:set>
+                                      <p:cBhvr>
+                                        <p:cTn id="26" dur="1" fill="hold">
+                                          <p:stCondLst>
+                                            <p:cond delay="0"/>
+                                          </p:stCondLst>
+                                        </p:cTn>
+                                        <p:tgtEl>
+                                          <p:spTgt spid="40"/>
+                                        </p:tgtEl>
+                                        <p:attrNameLst>
+                                          <p:attrName>style.visibility</p:attrName>
+                                        </p:attrNameLst>
+                                      </p:cBhvr>
+                                      <p:to>
+                                        <p:strVal val="visible"/>
+                                      </p:to>
+                                    </p:set>
+                                    <p:animEffect transition="in" filter="dissolve">
+                                      <p:cBhvr>
+                                        <p:cTn id="27" dur="500"/>
+                                        <p:tgtEl>
+                                          <p:spTgt spid="40"/>
+                                        </p:tgtEl>
+                                      </p:cBhvr>
+                                    </p:animEffect>
+                                  </p:childTnLst>
+                                </p:cTn>
+                              </p:par>
+                              <p:par>
+                                <p:cTn id="28" presetID="9" presetClass="entr" presetSubtype="0" fill="hold" grpId="0" nodeType="withEffect">
+                                  <p:stCondLst>
+                                    <p:cond delay="0"/>
+                                  </p:stCondLst>
+                                  <p:childTnLst>
+                                    <p:set>
+                                      <p:cBhvr>
+                                        <p:cTn id="29" dur="1" fill="hold">
+                                          <p:stCondLst>
+                                            <p:cond delay="0"/>
+                                          </p:stCondLst>
+                                        </p:cTn>
+                                        <p:tgtEl>
+                                          <p:spTgt spid="39"/>
+                                        </p:tgtEl>
+                                        <p:attrNameLst>
+                                          <p:attrName>style.visibility</p:attrName>
+                                        </p:attrNameLst>
+                                      </p:cBhvr>
+                                      <p:to>
+                                        <p:strVal val="visible"/>
+                                      </p:to>
+                                    </p:set>
+                                    <p:animEffect transition="in" filter="dissolve">
+                                      <p:cBhvr>
+                                        <p:cTn id="30" dur="500"/>
+                                        <p:tgtEl>
+                                          <p:spTgt spid="39"/>
+                                        </p:tgtEl>
+                                      </p:cBhvr>
+                                    </p:animEffect>
+                                  </p:childTnLst>
+                                </p:cTn>
+                              </p:par>
+                              <p:par>
+                                <p:cTn id="31" presetID="9" presetClass="entr" presetSubtype="0" fill="hold" nodeType="withEffect">
+                                  <p:stCondLst>
+                                    <p:cond delay="0"/>
+                                  </p:stCondLst>
+                                  <p:childTnLst>
+                                    <p:set>
+                                      <p:cBhvr>
+                                        <p:cTn id="32" dur="1" fill="hold">
+                                          <p:stCondLst>
+                                            <p:cond delay="0"/>
+                                          </p:stCondLst>
+                                        </p:cTn>
+                                        <p:tgtEl>
+                                          <p:spTgt spid="21"/>
+                                        </p:tgtEl>
+                                        <p:attrNameLst>
+                                          <p:attrName>style.visibility</p:attrName>
+                                        </p:attrNameLst>
+                                      </p:cBhvr>
+                                      <p:to>
+                                        <p:strVal val="visible"/>
+                                      </p:to>
+                                    </p:set>
+                                    <p:animEffect transition="in" filter="dissolve">
+                                      <p:cBhvr>
+                                        <p:cTn id="33" dur="500"/>
+                                        <p:tgtEl>
+                                          <p:spTgt spid="21"/>
+                                        </p:tgtEl>
+                                      </p:cBhvr>
+                                    </p:animEffect>
+                                  </p:childTnLst>
+                                </p:cTn>
+                              </p:par>
+                              <p:par>
+                                <p:cTn id="34" presetID="9" presetClass="entr" presetSubtype="0" fill="hold" nodeType="withEffect">
+                                  <p:stCondLst>
+                                    <p:cond delay="0"/>
+                                  </p:stCondLst>
+                                  <p:childTnLst>
+                                    <p:set>
+                                      <p:cBhvr>
+                                        <p:cTn id="35" dur="1" fill="hold">
+                                          <p:stCondLst>
+                                            <p:cond delay="0"/>
+                                          </p:stCondLst>
+                                        </p:cTn>
+                                        <p:tgtEl>
+                                          <p:spTgt spid="36"/>
+                                        </p:tgtEl>
+                                        <p:attrNameLst>
+                                          <p:attrName>style.visibility</p:attrName>
+                                        </p:attrNameLst>
+                                      </p:cBhvr>
+                                      <p:to>
+                                        <p:strVal val="visible"/>
+                                      </p:to>
+                                    </p:set>
+                                    <p:animEffect transition="in" filter="dissolve">
+                                      <p:cBhvr>
+                                        <p:cTn id="36" dur="500"/>
+                                        <p:tgtEl>
+                                          <p:spTgt spid="36"/>
+                                        </p:tgtEl>
+                                      </p:cBhvr>
+                                    </p:animEffect>
+                                  </p:childTnLst>
+                                </p:cTn>
+                              </p:par>
+                            </p:childTnLst>
+                          </p:cTn>
+                        </p:par>
+                      </p:childTnLst>
+                    </p:cTn>
+                  </p:par>
+                  <p:par>
+                    <p:cTn id="37" fill="hold">
+                      <p:stCondLst>
+                        <p:cond delay="indefinite"/>
+                      </p:stCondLst>
+                      <p:childTnLst>
+                        <p:par>
+                          <p:cTn id="38" fill="hold">
+                            <p:stCondLst>
+                              <p:cond delay="0"/>
+                            </p:stCondLst>
+                            <p:childTnLst>
+                              <p:par>
+                                <p:cTn id="39" presetID="2" presetClass="entr" presetSubtype="4" fill="hold" nodeType="clickEffect">
+                                  <p:stCondLst>
+                                    <p:cond delay="0"/>
+                                  </p:stCondLst>
+                                  <p:childTnLst>
+                                    <p:set>
+                                      <p:cBhvr>
+                                        <p:cTn id="40" dur="1" fill="hold">
+                                          <p:stCondLst>
+                                            <p:cond delay="0"/>
+                                          </p:stCondLst>
+                                        </p:cTn>
+                                        <p:tgtEl>
+                                          <p:spTgt spid="33"/>
+                                        </p:tgtEl>
+                                        <p:attrNameLst>
+                                          <p:attrName>style.visibility</p:attrName>
+                                        </p:attrNameLst>
+                                      </p:cBhvr>
+                                      <p:to>
+                                        <p:strVal val="visible"/>
+                                      </p:to>
+                                    </p:set>
+                                    <p:anim calcmode="lin" valueType="num">
+                                      <p:cBhvr additive="base">
+                                        <p:cTn id="41" dur="500" fill="hold"/>
+                                        <p:tgtEl>
+                                          <p:spTgt spid="33"/>
+                                        </p:tgtEl>
+                                        <p:attrNameLst>
+                                          <p:attrName>ppt_x</p:attrName>
+                                        </p:attrNameLst>
+                                      </p:cBhvr>
+                                      <p:tavLst>
+                                        <p:tav tm="0">
+                                          <p:val>
+                                            <p:strVal val="#ppt_x"/>
+                                          </p:val>
+                                        </p:tav>
+                                        <p:tav tm="100000">
+                                          <p:val>
+                                            <p:strVal val="#ppt_x"/>
+                                          </p:val>
+                                        </p:tav>
+                                      </p:tavLst>
+                                    </p:anim>
+                                    <p:anim calcmode="lin" valueType="num">
+                                      <p:cBhvr additive="base">
+                                        <p:cTn id="42" dur="500" fill="hold"/>
+                                        <p:tgtEl>
+                                          <p:spTgt spid="33"/>
+                                        </p:tgtEl>
+                                        <p:attrNameLst>
+                                          <p:attrName>ppt_y</p:attrName>
+                                        </p:attrNameLst>
+                                      </p:cBhvr>
+                                      <p:tavLst>
+                                        <p:tav tm="0">
+                                          <p:val>
+                                            <p:strVal val="1+#ppt_h/2"/>
+                                          </p:val>
+                                        </p:tav>
+                                        <p:tav tm="100000">
+                                          <p:val>
+                                            <p:strVal val="#ppt_y"/>
+                                          </p:val>
+                                        </p:tav>
+                                      </p:tavLst>
+                                    </p:anim>
+                                  </p:childTnLst>
+                                </p:cTn>
+                              </p:par>
+                              <p:par>
+                                <p:cTn id="43" presetID="2" presetClass="entr" presetSubtype="4" fill="hold" nodeType="withEffect">
+                                  <p:stCondLst>
+                                    <p:cond delay="0"/>
+                                  </p:stCondLst>
+                                  <p:childTnLst>
+                                    <p:set>
+                                      <p:cBhvr>
+                                        <p:cTn id="44" dur="1" fill="hold">
+                                          <p:stCondLst>
+                                            <p:cond delay="0"/>
+                                          </p:stCondLst>
+                                        </p:cTn>
+                                        <p:tgtEl>
+                                          <p:spTgt spid="20"/>
+                                        </p:tgtEl>
+                                        <p:attrNameLst>
+                                          <p:attrName>style.visibility</p:attrName>
+                                        </p:attrNameLst>
+                                      </p:cBhvr>
+                                      <p:to>
+                                        <p:strVal val="visible"/>
+                                      </p:to>
+                                    </p:set>
+                                    <p:anim calcmode="lin" valueType="num">
+                                      <p:cBhvr additive="base">
+                                        <p:cTn id="45" dur="500" fill="hold"/>
+                                        <p:tgtEl>
+                                          <p:spTgt spid="20"/>
+                                        </p:tgtEl>
+                                        <p:attrNameLst>
+                                          <p:attrName>ppt_x</p:attrName>
+                                        </p:attrNameLst>
+                                      </p:cBhvr>
+                                      <p:tavLst>
+                                        <p:tav tm="0">
+                                          <p:val>
+                                            <p:strVal val="#ppt_x"/>
+                                          </p:val>
+                                        </p:tav>
+                                        <p:tav tm="100000">
+                                          <p:val>
+                                            <p:strVal val="#ppt_x"/>
+                                          </p:val>
+                                        </p:tav>
+                                      </p:tavLst>
+                                    </p:anim>
+                                    <p:anim calcmode="lin" valueType="num">
+                                      <p:cBhvr additive="base">
+                                        <p:cTn id="46" dur="500" fill="hold"/>
+                                        <p:tgtEl>
+                                          <p:spTgt spid="20"/>
+                                        </p:tgtEl>
+                                        <p:attrNameLst>
+                                          <p:attrName>ppt_y</p:attrName>
+                                        </p:attrNameLst>
+                                      </p:cBhvr>
+                                      <p:tavLst>
+                                        <p:tav tm="0">
+                                          <p:val>
+                                            <p:strVal val="1+#ppt_h/2"/>
+                                          </p:val>
+                                        </p:tav>
+                                        <p:tav tm="100000">
+                                          <p:val>
+                                            <p:strVal val="#ppt_y"/>
+                                          </p:val>
+                                        </p:tav>
+                                      </p:tavLst>
+                                    </p:anim>
+                                  </p:childTnLst>
+                                </p:cTn>
+                              </p:par>
+                              <p:par>
+                                <p:cTn id="47" presetID="2" presetClass="entr" presetSubtype="4" fill="hold" nodeType="withEffect">
+                                  <p:stCondLst>
+                                    <p:cond delay="0"/>
+                                  </p:stCondLst>
+                                  <p:childTnLst>
+                                    <p:set>
+                                      <p:cBhvr>
+                                        <p:cTn id="48" dur="1" fill="hold">
+                                          <p:stCondLst>
+                                            <p:cond delay="0"/>
+                                          </p:stCondLst>
+                                        </p:cTn>
+                                        <p:tgtEl>
+                                          <p:spTgt spid="34"/>
+                                        </p:tgtEl>
+                                        <p:attrNameLst>
+                                          <p:attrName>style.visibility</p:attrName>
+                                        </p:attrNameLst>
+                                      </p:cBhvr>
+                                      <p:to>
+                                        <p:strVal val="visible"/>
+                                      </p:to>
+                                    </p:set>
+                                    <p:anim calcmode="lin" valueType="num">
+                                      <p:cBhvr additive="base">
+                                        <p:cTn id="49" dur="500" fill="hold"/>
+                                        <p:tgtEl>
+                                          <p:spTgt spid="34"/>
+                                        </p:tgtEl>
+                                        <p:attrNameLst>
+                                          <p:attrName>ppt_x</p:attrName>
+                                        </p:attrNameLst>
+                                      </p:cBhvr>
+                                      <p:tavLst>
+                                        <p:tav tm="0">
+                                          <p:val>
+                                            <p:strVal val="#ppt_x"/>
+                                          </p:val>
+                                        </p:tav>
+                                        <p:tav tm="100000">
+                                          <p:val>
+                                            <p:strVal val="#ppt_x"/>
+                                          </p:val>
+                                        </p:tav>
+                                      </p:tavLst>
+                                    </p:anim>
+                                    <p:anim calcmode="lin" valueType="num">
+                                      <p:cBhvr additive="base">
+                                        <p:cTn id="50" dur="500" fill="hold"/>
+                                        <p:tgtEl>
+                                          <p:spTgt spid="34"/>
+                                        </p:tgtEl>
+                                        <p:attrNameLst>
+                                          <p:attrName>ppt_y</p:attrName>
+                                        </p:attrNameLst>
+                                      </p:cBhvr>
+                                      <p:tavLst>
+                                        <p:tav tm="0">
+                                          <p:val>
+                                            <p:strVal val="1+#ppt_h/2"/>
+                                          </p:val>
+                                        </p:tav>
+                                        <p:tav tm="100000">
+                                          <p:val>
+                                            <p:strVal val="#ppt_y"/>
+                                          </p:val>
+                                        </p:tav>
+                                      </p:tavLst>
+                                    </p:anim>
+                                  </p:childTnLst>
+                                </p:cTn>
+                              </p:par>
+                              <p:par>
+                                <p:cTn id="51" presetID="2" presetClass="entr" presetSubtype="4" fill="hold" grpId="0" nodeType="withEffect">
+                                  <p:stCondLst>
+                                    <p:cond delay="0"/>
+                                  </p:stCondLst>
+                                  <p:childTnLst>
+                                    <p:set>
+                                      <p:cBhvr>
+                                        <p:cTn id="52" dur="1" fill="hold">
+                                          <p:stCondLst>
+                                            <p:cond delay="0"/>
+                                          </p:stCondLst>
+                                        </p:cTn>
+                                        <p:tgtEl>
+                                          <p:spTgt spid="31"/>
+                                        </p:tgtEl>
+                                        <p:attrNameLst>
+                                          <p:attrName>style.visibility</p:attrName>
+                                        </p:attrNameLst>
+                                      </p:cBhvr>
+                                      <p:to>
+                                        <p:strVal val="visible"/>
+                                      </p:to>
+                                    </p:set>
+                                    <p:anim calcmode="lin" valueType="num">
+                                      <p:cBhvr additive="base">
+                                        <p:cTn id="53" dur="500" fill="hold"/>
+                                        <p:tgtEl>
+                                          <p:spTgt spid="31"/>
+                                        </p:tgtEl>
+                                        <p:attrNameLst>
+                                          <p:attrName>ppt_x</p:attrName>
+                                        </p:attrNameLst>
+                                      </p:cBhvr>
+                                      <p:tavLst>
+                                        <p:tav tm="0">
+                                          <p:val>
+                                            <p:strVal val="#ppt_x"/>
+                                          </p:val>
+                                        </p:tav>
+                                        <p:tav tm="100000">
+                                          <p:val>
+                                            <p:strVal val="#ppt_x"/>
+                                          </p:val>
+                                        </p:tav>
+                                      </p:tavLst>
+                                    </p:anim>
+                                    <p:anim calcmode="lin" valueType="num">
+                                      <p:cBhvr additive="base">
+                                        <p:cTn id="54" dur="500" fill="hold"/>
+                                        <p:tgtEl>
+                                          <p:spTgt spid="31"/>
+                                        </p:tgtEl>
+                                        <p:attrNameLst>
+                                          <p:attrName>ppt_y</p:attrName>
+                                        </p:attrNameLst>
+                                      </p:cBhvr>
+                                      <p:tavLst>
+                                        <p:tav tm="0">
+                                          <p:val>
+                                            <p:strVal val="1+#ppt_h/2"/>
+                                          </p:val>
+                                        </p:tav>
+                                        <p:tav tm="100000">
+                                          <p:val>
+                                            <p:strVal val="#ppt_y"/>
+                                          </p:val>
+                                        </p:tav>
+                                      </p:tavLst>
+                                    </p:anim>
+                                  </p:childTnLst>
+                                </p:cTn>
+                              </p:par>
+                            </p:childTnLst>
+                          </p:cTn>
+                        </p:par>
+                      </p:childTnLst>
+                    </p:cTn>
+                  </p:par>
+                  <p:par>
+                    <p:cTn id="55" fill="hold">
+                      <p:stCondLst>
+                        <p:cond delay="indefinite"/>
+                      </p:stCondLst>
+                      <p:childTnLst>
+                        <p:par>
+                          <p:cTn id="56" fill="hold">
+                            <p:stCondLst>
+                              <p:cond delay="0"/>
+                            </p:stCondLst>
+                            <p:childTnLst>
+                              <p:par>
+                                <p:cTn id="57" presetID="16" presetClass="entr" presetSubtype="21" fill="hold" nodeType="clickEffect">
+                                  <p:stCondLst>
+                                    <p:cond delay="0"/>
+                                  </p:stCondLst>
+                                  <p:childTnLst>
+                                    <p:set>
+                                      <p:cBhvr>
+                                        <p:cTn id="58" dur="1" fill="hold">
+                                          <p:stCondLst>
+                                            <p:cond delay="0"/>
+                                          </p:stCondLst>
+                                        </p:cTn>
+                                        <p:tgtEl>
+                                          <p:spTgt spid="23"/>
+                                        </p:tgtEl>
+                                        <p:attrNameLst>
+                                          <p:attrName>style.visibility</p:attrName>
+                                        </p:attrNameLst>
+                                      </p:cBhvr>
+                                      <p:to>
+                                        <p:strVal val="visible"/>
+                                      </p:to>
+                                    </p:set>
+                                    <p:animEffect transition="in" filter="barn(inVertical)">
+                                      <p:cBhvr>
+                                        <p:cTn id="59" dur="500"/>
+                                        <p:tgtEl>
+                                          <p:spTgt spid="23"/>
+                                        </p:tgtEl>
+                                      </p:cBhvr>
+                                    </p:animEffect>
+                                  </p:childTnLst>
+                                </p:cTn>
+                              </p:par>
+                              <p:par>
+                                <p:cTn id="60" presetID="16" presetClass="entr" presetSubtype="21" fill="hold" grpId="0" nodeType="withEffect">
+                                  <p:stCondLst>
+                                    <p:cond delay="0"/>
+                                  </p:stCondLst>
+                                  <p:childTnLst>
+                                    <p:set>
+                                      <p:cBhvr>
+                                        <p:cTn id="61" dur="1" fill="hold">
+                                          <p:stCondLst>
+                                            <p:cond delay="0"/>
+                                          </p:stCondLst>
+                                        </p:cTn>
+                                        <p:tgtEl>
+                                          <p:spTgt spid="30"/>
+                                        </p:tgtEl>
+                                        <p:attrNameLst>
+                                          <p:attrName>style.visibility</p:attrName>
+                                        </p:attrNameLst>
+                                      </p:cBhvr>
+                                      <p:to>
+                                        <p:strVal val="visible"/>
+                                      </p:to>
+                                    </p:set>
+                                    <p:animEffect transition="in" filter="barn(inVertical)">
+                                      <p:cBhvr>
+                                        <p:cTn id="62" dur="500"/>
+                                        <p:tgtEl>
+                                          <p:spTgt spid="30"/>
+                                        </p:tgtEl>
+                                      </p:cBhvr>
+                                    </p:animEffect>
+                                  </p:childTnLst>
+                                </p:cTn>
+                              </p:par>
+                            </p:childTnLst>
+                          </p:cTn>
+                        </p:par>
+                      </p:childTnLst>
+                    </p:cTn>
+                  </p:par>
+                  <p:par>
+                    <p:cTn id="63" fill="hold">
+                      <p:stCondLst>
+                        <p:cond delay="indefinite"/>
+                      </p:stCondLst>
+                      <p:childTnLst>
+                        <p:par>
+                          <p:cTn id="64" fill="hold">
+                            <p:stCondLst>
+                              <p:cond delay="0"/>
+                            </p:stCondLst>
+                            <p:childTnLst>
+                              <p:par>
+                                <p:cTn id="65" presetID="2" presetClass="entr" presetSubtype="4" fill="hold" nodeType="clickEffect">
+                                  <p:stCondLst>
+                                    <p:cond delay="0"/>
+                                  </p:stCondLst>
+                                  <p:childTnLst>
+                                    <p:set>
+                                      <p:cBhvr>
+                                        <p:cTn id="66" dur="1" fill="hold">
+                                          <p:stCondLst>
+                                            <p:cond delay="0"/>
+                                          </p:stCondLst>
+                                        </p:cTn>
+                                        <p:tgtEl>
+                                          <p:spTgt spid="29"/>
+                                        </p:tgtEl>
+                                        <p:attrNameLst>
+                                          <p:attrName>style.visibility</p:attrName>
+                                        </p:attrNameLst>
+                                      </p:cBhvr>
+                                      <p:to>
+                                        <p:strVal val="visible"/>
+                                      </p:to>
+                                    </p:set>
+                                    <p:anim calcmode="lin" valueType="num">
+                                      <p:cBhvr additive="base">
+                                        <p:cTn id="67" dur="500" fill="hold"/>
+                                        <p:tgtEl>
+                                          <p:spTgt spid="29"/>
+                                        </p:tgtEl>
+                                        <p:attrNameLst>
+                                          <p:attrName>ppt_x</p:attrName>
+                                        </p:attrNameLst>
+                                      </p:cBhvr>
+                                      <p:tavLst>
+                                        <p:tav tm="0">
+                                          <p:val>
+                                            <p:strVal val="#ppt_x"/>
+                                          </p:val>
+                                        </p:tav>
+                                        <p:tav tm="100000">
+                                          <p:val>
+                                            <p:strVal val="#ppt_x"/>
+                                          </p:val>
+                                        </p:tav>
+                                      </p:tavLst>
+                                    </p:anim>
+                                    <p:anim calcmode="lin" valueType="num">
+                                      <p:cBhvr additive="base">
+                                        <p:cTn id="68" dur="500" fill="hold"/>
+                                        <p:tgtEl>
+                                          <p:spTgt spid="29"/>
+                                        </p:tgtEl>
+                                        <p:attrNameLst>
+                                          <p:attrName>ppt_y</p:attrName>
+                                        </p:attrNameLst>
+                                      </p:cBhvr>
+                                      <p:tavLst>
+                                        <p:tav tm="0">
+                                          <p:val>
+                                            <p:strVal val="1+#ppt_h/2"/>
+                                          </p:val>
+                                        </p:tav>
+                                        <p:tav tm="100000">
+                                          <p:val>
+                                            <p:strVal val="#ppt_y"/>
+                                          </p:val>
+                                        </p:tav>
+                                      </p:tavLst>
+                                    </p:anim>
+                                  </p:childTnLst>
+                                </p:cTn>
+                              </p:par>
+                              <p:par>
+                                <p:cTn id="69" presetID="2" presetClass="entr" presetSubtype="4" fill="hold" nodeType="withEffect">
+                                  <p:stCondLst>
+                                    <p:cond delay="0"/>
+                                  </p:stCondLst>
+                                  <p:childTnLst>
+                                    <p:set>
+                                      <p:cBhvr>
+                                        <p:cTn id="70" dur="1" fill="hold">
+                                          <p:stCondLst>
+                                            <p:cond delay="0"/>
+                                          </p:stCondLst>
+                                        </p:cTn>
+                                        <p:tgtEl>
+                                          <p:spTgt spid="25"/>
+                                        </p:tgtEl>
+                                        <p:attrNameLst>
+                                          <p:attrName>style.visibility</p:attrName>
+                                        </p:attrNameLst>
+                                      </p:cBhvr>
+                                      <p:to>
+                                        <p:strVal val="visible"/>
+                                      </p:to>
+                                    </p:set>
+                                    <p:anim calcmode="lin" valueType="num">
+                                      <p:cBhvr additive="base">
+                                        <p:cTn id="71" dur="500" fill="hold"/>
+                                        <p:tgtEl>
+                                          <p:spTgt spid="25"/>
+                                        </p:tgtEl>
+                                        <p:attrNameLst>
+                                          <p:attrName>ppt_x</p:attrName>
+                                        </p:attrNameLst>
+                                      </p:cBhvr>
+                                      <p:tavLst>
+                                        <p:tav tm="0">
+                                          <p:val>
+                                            <p:strVal val="#ppt_x"/>
+                                          </p:val>
+                                        </p:tav>
+                                        <p:tav tm="100000">
+                                          <p:val>
+                                            <p:strVal val="#ppt_x"/>
+                                          </p:val>
+                                        </p:tav>
+                                      </p:tavLst>
+                                    </p:anim>
+                                    <p:anim calcmode="lin" valueType="num">
+                                      <p:cBhvr additive="base">
+                                        <p:cTn id="72" dur="500" fill="hold"/>
+                                        <p:tgtEl>
+                                          <p:spTgt spid="25"/>
+                                        </p:tgtEl>
+                                        <p:attrNameLst>
+                                          <p:attrName>ppt_y</p:attrName>
+                                        </p:attrNameLst>
+                                      </p:cBhvr>
+                                      <p:tavLst>
+                                        <p:tav tm="0">
+                                          <p:val>
+                                            <p:strVal val="1+#ppt_h/2"/>
+                                          </p:val>
+                                        </p:tav>
+                                        <p:tav tm="100000">
+                                          <p:val>
+                                            <p:strVal val="#ppt_y"/>
+                                          </p:val>
+                                        </p:tav>
+                                      </p:tavLst>
+                                    </p:anim>
+                                  </p:childTnLst>
+                                </p:cTn>
+                              </p:par>
+                              <p:par>
+                                <p:cTn id="73" presetID="2" presetClass="entr" presetSubtype="4" fill="hold" nodeType="withEffect">
+                                  <p:stCondLst>
+                                    <p:cond delay="0"/>
+                                  </p:stCondLst>
+                                  <p:childTnLst>
+                                    <p:set>
+                                      <p:cBhvr>
+                                        <p:cTn id="74" dur="1" fill="hold">
+                                          <p:stCondLst>
+                                            <p:cond delay="0"/>
+                                          </p:stCondLst>
+                                        </p:cTn>
+                                        <p:tgtEl>
+                                          <p:spTgt spid="28"/>
+                                        </p:tgtEl>
+                                        <p:attrNameLst>
+                                          <p:attrName>style.visibility</p:attrName>
+                                        </p:attrNameLst>
+                                      </p:cBhvr>
+                                      <p:to>
+                                        <p:strVal val="visible"/>
+                                      </p:to>
+                                    </p:set>
+                                    <p:anim calcmode="lin" valueType="num">
+                                      <p:cBhvr additive="base">
+                                        <p:cTn id="75" dur="500" fill="hold"/>
+                                        <p:tgtEl>
+                                          <p:spTgt spid="28"/>
+                                        </p:tgtEl>
+                                        <p:attrNameLst>
+                                          <p:attrName>ppt_x</p:attrName>
+                                        </p:attrNameLst>
+                                      </p:cBhvr>
+                                      <p:tavLst>
+                                        <p:tav tm="0">
+                                          <p:val>
+                                            <p:strVal val="#ppt_x"/>
+                                          </p:val>
+                                        </p:tav>
+                                        <p:tav tm="100000">
+                                          <p:val>
+                                            <p:strVal val="#ppt_x"/>
+                                          </p:val>
+                                        </p:tav>
+                                      </p:tavLst>
+                                    </p:anim>
+                                    <p:anim calcmode="lin" valueType="num">
+                                      <p:cBhvr additive="base">
+                                        <p:cTn id="76" dur="500" fill="hold"/>
+                                        <p:tgtEl>
+                                          <p:spTgt spid="28"/>
+                                        </p:tgtEl>
+                                        <p:attrNameLst>
+                                          <p:attrName>ppt_y</p:attrName>
+                                        </p:attrNameLst>
+                                      </p:cBhvr>
+                                      <p:tavLst>
+                                        <p:tav tm="0">
+                                          <p:val>
+                                            <p:strVal val="1+#ppt_h/2"/>
+                                          </p:val>
+                                        </p:tav>
+                                        <p:tav tm="100000">
+                                          <p:val>
+                                            <p:strVal val="#ppt_y"/>
+                                          </p:val>
+                                        </p:tav>
+                                      </p:tavLst>
+                                    </p:anim>
+                                  </p:childTnLst>
+                                </p:cTn>
+                              </p:par>
+                              <p:par>
+                                <p:cTn id="77" presetID="2" presetClass="entr" presetSubtype="4" fill="hold" nodeType="withEffect">
+                                  <p:stCondLst>
+                                    <p:cond delay="0"/>
+                                  </p:stCondLst>
+                                  <p:childTnLst>
+                                    <p:set>
+                                      <p:cBhvr>
+                                        <p:cTn id="78" dur="1" fill="hold">
+                                          <p:stCondLst>
+                                            <p:cond delay="0"/>
+                                          </p:stCondLst>
+                                        </p:cTn>
+                                        <p:tgtEl>
+                                          <p:spTgt spid="27"/>
+                                        </p:tgtEl>
+                                        <p:attrNameLst>
+                                          <p:attrName>style.visibility</p:attrName>
+                                        </p:attrNameLst>
+                                      </p:cBhvr>
+                                      <p:to>
+                                        <p:strVal val="visible"/>
+                                      </p:to>
+                                    </p:set>
+                                    <p:anim calcmode="lin" valueType="num">
+                                      <p:cBhvr additive="base">
+                                        <p:cTn id="79" dur="500" fill="hold"/>
+                                        <p:tgtEl>
+                                          <p:spTgt spid="27"/>
+                                        </p:tgtEl>
+                                        <p:attrNameLst>
+                                          <p:attrName>ppt_x</p:attrName>
+                                        </p:attrNameLst>
+                                      </p:cBhvr>
+                                      <p:tavLst>
+                                        <p:tav tm="0">
+                                          <p:val>
+                                            <p:strVal val="#ppt_x"/>
+                                          </p:val>
+                                        </p:tav>
+                                        <p:tav tm="100000">
+                                          <p:val>
+                                            <p:strVal val="#ppt_x"/>
+                                          </p:val>
+                                        </p:tav>
+                                      </p:tavLst>
+                                    </p:anim>
+                                    <p:anim calcmode="lin" valueType="num">
+                                      <p:cBhvr additive="base">
+                                        <p:cTn id="80" dur="500" fill="hold"/>
+                                        <p:tgtEl>
+                                          <p:spTgt spid="27"/>
+                                        </p:tgtEl>
+                                        <p:attrNameLst>
+                                          <p:attrName>ppt_y</p:attrName>
+                                        </p:attrNameLst>
+                                      </p:cBhvr>
+                                      <p:tavLst>
+                                        <p:tav tm="0">
+                                          <p:val>
+                                            <p:strVal val="1+#ppt_h/2"/>
+                                          </p:val>
+                                        </p:tav>
+                                        <p:tav tm="100000">
+                                          <p:val>
+                                            <p:strVal val="#ppt_y"/>
+                                          </p:val>
+                                        </p:tav>
+                                      </p:tavLst>
+                                    </p:anim>
+                                  </p:childTnLst>
+                                </p:cTn>
+                              </p:par>
+                              <p:par>
+                                <p:cTn id="81" presetID="2" presetClass="entr" presetSubtype="4" fill="hold" nodeType="withEffect">
+                                  <p:stCondLst>
+                                    <p:cond delay="0"/>
+                                  </p:stCondLst>
+                                  <p:childTnLst>
+                                    <p:set>
+                                      <p:cBhvr>
+                                        <p:cTn id="82" dur="1" fill="hold">
+                                          <p:stCondLst>
+                                            <p:cond delay="0"/>
+                                          </p:stCondLst>
+                                        </p:cTn>
+                                        <p:tgtEl>
+                                          <p:spTgt spid="22"/>
+                                        </p:tgtEl>
+                                        <p:attrNameLst>
+                                          <p:attrName>style.visibility</p:attrName>
+                                        </p:attrNameLst>
+                                      </p:cBhvr>
+                                      <p:to>
+                                        <p:strVal val="visible"/>
+                                      </p:to>
+                                    </p:set>
+                                    <p:anim calcmode="lin" valueType="num">
+                                      <p:cBhvr additive="base">
+                                        <p:cTn id="83" dur="500" fill="hold"/>
+                                        <p:tgtEl>
+                                          <p:spTgt spid="22"/>
+                                        </p:tgtEl>
+                                        <p:attrNameLst>
+                                          <p:attrName>ppt_x</p:attrName>
+                                        </p:attrNameLst>
+                                      </p:cBhvr>
+                                      <p:tavLst>
+                                        <p:tav tm="0">
+                                          <p:val>
+                                            <p:strVal val="#ppt_x"/>
+                                          </p:val>
+                                        </p:tav>
+                                        <p:tav tm="100000">
+                                          <p:val>
+                                            <p:strVal val="#ppt_x"/>
+                                          </p:val>
+                                        </p:tav>
+                                      </p:tavLst>
+                                    </p:anim>
+                                    <p:anim calcmode="lin" valueType="num">
+                                      <p:cBhvr additive="base">
+                                        <p:cTn id="84" dur="500" fill="hold"/>
+                                        <p:tgtEl>
+                                          <p:spTgt spid="22"/>
+                                        </p:tgtEl>
+                                        <p:attrNameLst>
+                                          <p:attrName>ppt_y</p:attrName>
+                                        </p:attrNameLst>
+                                      </p:cBhvr>
+                                      <p:tavLst>
+                                        <p:tav tm="0">
+                                          <p:val>
+                                            <p:strVal val="1+#ppt_h/2"/>
+                                          </p:val>
+                                        </p:tav>
+                                        <p:tav tm="100000">
+                                          <p:val>
+                                            <p:strVal val="#ppt_y"/>
+                                          </p:val>
+                                        </p:tav>
+                                      </p:tavLst>
+                                    </p:anim>
+                                  </p:childTnLst>
+                                </p:cTn>
+                              </p:par>
+                              <p:par>
+                                <p:cTn id="85" presetID="2" presetClass="entr" presetSubtype="4" fill="hold" grpId="0" nodeType="withEffect">
+                                  <p:stCondLst>
+                                    <p:cond delay="0"/>
+                                  </p:stCondLst>
+                                  <p:childTnLst>
+                                    <p:set>
+                                      <p:cBhvr>
+                                        <p:cTn id="86" dur="1" fill="hold">
+                                          <p:stCondLst>
+                                            <p:cond delay="0"/>
+                                          </p:stCondLst>
+                                        </p:cTn>
+                                        <p:tgtEl>
+                                          <p:spTgt spid="35"/>
+                                        </p:tgtEl>
+                                        <p:attrNameLst>
+                                          <p:attrName>style.visibility</p:attrName>
+                                        </p:attrNameLst>
+                                      </p:cBhvr>
+                                      <p:to>
+                                        <p:strVal val="visible"/>
+                                      </p:to>
+                                    </p:set>
+                                    <p:anim calcmode="lin" valueType="num">
+                                      <p:cBhvr additive="base">
+                                        <p:cTn id="87" dur="500" fill="hold"/>
+                                        <p:tgtEl>
+                                          <p:spTgt spid="35"/>
+                                        </p:tgtEl>
+                                        <p:attrNameLst>
+                                          <p:attrName>ppt_x</p:attrName>
+                                        </p:attrNameLst>
+                                      </p:cBhvr>
+                                      <p:tavLst>
+                                        <p:tav tm="0">
+                                          <p:val>
+                                            <p:strVal val="#ppt_x"/>
+                                          </p:val>
+                                        </p:tav>
+                                        <p:tav tm="100000">
+                                          <p:val>
+                                            <p:strVal val="#ppt_x"/>
+                                          </p:val>
+                                        </p:tav>
+                                      </p:tavLst>
+                                    </p:anim>
+                                    <p:anim calcmode="lin" valueType="num">
+                                      <p:cBhvr additive="base">
+                                        <p:cTn id="88" dur="500" fill="hold"/>
+                                        <p:tgtEl>
+                                          <p:spTgt spid="35"/>
+                                        </p:tgtEl>
+                                        <p:attrNameLst>
+                                          <p:attrName>ppt_y</p:attrName>
+                                        </p:attrNameLst>
+                                      </p:cBhvr>
+                                      <p:tavLst>
+                                        <p:tav tm="0">
+                                          <p:val>
+                                            <p:strVal val="1+#ppt_h/2"/>
+                                          </p:val>
+                                        </p:tav>
+                                        <p:tav tm="100000">
+                                          <p:val>
+                                            <p:strVal val="#ppt_y"/>
+                                          </p:val>
+                                        </p:tav>
+                                      </p:tavLst>
+                                    </p:anim>
+                                  </p:childTnLst>
+                                </p:cTn>
+                              </p:par>
+                            </p:childTnLst>
+                          </p:cTn>
+                        </p:par>
+                      </p:childTnLst>
+                    </p:cTn>
+                  </p:par>
+                </p:childTnLst>
+              </p:cTn>
+              <p:prevCondLst>
+                <p:cond evt="onPrev" delay="0">
+                  <p:tgtEl>
+                    <p:sldTgt/>
+                  </p:tgtEl>
+                </p:cond>
+              </p:prevCondLst>
+              <p:nextCondLst>
+                <p:cond evt="onNext" delay="0">
+                  <p:tgtEl>
+                    <p:sldTgt/>
+                  </p:tgtEl>
+                </p:cond>
+              </p:nextCondLst>
+            </p:seq>
+          </p:childTnLst>
+        </p:cTn>
+      </p:par>
+    </p:tnLst>
+    <p:bldLst>
+      <p:bldP spid="42" grpId="0" animBg="1"/>
+      <p:bldP spid="44" grpId="0" animBg="1"/>
+      <p:bldP spid="42" grpId="1" animBg="1"/>
+      <p:bldP spid="44" grpId="1" animBg="1"/>
+      <p:bldP spid="40" grpId="0" animBg="1"/>
+      <p:bldP spid="39" grpId="0" animBg="1"/>
+      <p:bldP spid="40" grpId="1" animBg="1"/>
+      <p:bldP spid="39" grpId="1" animBg="1"/>
+      <p:bldP spid="31" grpId="0" animBg="1"/>
+      <p:bldP spid="31" grpId="1" animBg="1"/>
+      <p:bldP spid="30" grpId="0" animBg="1"/>
+      <p:bldP spid="35" grpId="0" animBg="1"/>
+      <p:bldP spid="35" grpId="1" animBg="1"/>
+    </p:bldLst>
+  </p:timing>
 </p:sld>
 </file>
 

</xml_diff>